<commit_message>
fix path issue in build.mjs
</commit_message>
<xml_diff>
--- a/output/slides.pptx
+++ b/output/slides.pptx
@@ -3113,20 +3113,15 @@
       </p:grpSpPr>
       <p:sp>
         <p:nvSpPr>
-          <p:cNvPr id="2" name="Title 1"/>
-          <p:cNvSpPr>
-            <a:spLocks noGrp="1"/>
-          </p:cNvSpPr>
-          <p:nvPr>
-            <p:ph type="title"/>
-          </p:nvPr>
-        </p:nvSpPr>
-        <p:spPr>
-          <a:xfrm>
-            <a:off x="722313" y="4406900"/>
-            <a:ext cx="7772400" cy="1362075"/>
-          </a:xfrm>
-        </p:spPr>
+          <p:cNvPr id="3" name="Content Placeholder 2"/>
+          <p:cNvSpPr>
+            <a:spLocks noGrp="1"/>
+          </p:cNvSpPr>
+          <p:nvPr>
+            <p:ph idx="1"/>
+          </p:nvPr>
+        </p:nvSpPr>
+        <p:spPr/>
         <p:txBody>
           <a:bodyPr/>
           <a:lstStyle/>
@@ -3136,23 +3131,7 @@
             </a:pPr>
             <a:r>
               <a:rPr/>
-              <a:t>woah</a:t>
-            </a:r>
-            <a:r>
-              <a:rPr/>
-              <a:t> </a:t>
-            </a:r>
-            <a:r>
-              <a:rPr/>
-              <a:t>a</a:t>
-            </a:r>
-            <a:r>
-              <a:rPr/>
-              <a:t> </a:t>
-            </a:r>
-            <a:r>
-              <a:rPr/>
-              <a:t>test</a:t>
+              <a:t>../raw-slides/slides.md</a:t>
             </a:r>
           </a:p>
         </p:txBody>

</xml_diff>